<commit_message>
poster updated and screenshots added
</commit_message>
<xml_diff>
--- a/Coding Task II & Weather API Poster.pptx
+++ b/Coding Task II & Weather API Poster.pptx
@@ -8561,47 +8561,6 @@
           </a:p>
         </p:txBody>
       </p:sp>
-      <p:pic>
-        <p:nvPicPr>
-          <p:cNvPr id="81440" name="Picture 544" descr="C:\Users\Alastair\Documents\GitHub\Desktop_game\our code\SDL_project\Resources\goal.png"/>
-          <p:cNvPicPr>
-            <a:picLocks noChangeAspect="1" noChangeArrowheads="1"/>
-          </p:cNvPicPr>
-          <p:nvPr/>
-        </p:nvPicPr>
-        <p:blipFill>
-          <a:blip r:embed="rId2">
-            <a:extLst>
-              <a:ext uri="{28A0092B-C50C-407E-A947-70E740481C1C}">
-                <a14:useLocalDpi xmlns:a14="http://schemas.microsoft.com/office/drawing/2010/main" val="0"/>
-              </a:ext>
-            </a:extLst>
-          </a:blip>
-          <a:srcRect/>
-          <a:stretch>
-            <a:fillRect/>
-          </a:stretch>
-        </p:blipFill>
-        <p:spPr bwMode="auto">
-          <a:xfrm>
-            <a:off x="13247440" y="28879564"/>
-            <a:ext cx="2535520" cy="2535520"/>
-          </a:xfrm>
-          <a:prstGeom prst="rect">
-            <a:avLst/>
-          </a:prstGeom>
-          <a:noFill/>
-          <a:extLst>
-            <a:ext uri="{909E8E84-426E-40DD-AFC4-6F175D3DCCD1}">
-              <a14:hiddenFill xmlns:a14="http://schemas.microsoft.com/office/drawing/2010/main">
-                <a:solidFill>
-                  <a:srgbClr val="FFFFFF"/>
-                </a:solidFill>
-              </a14:hiddenFill>
-            </a:ext>
-          </a:extLst>
-        </p:spPr>
-      </p:pic>
       <p:sp>
         <p:nvSpPr>
           <p:cNvPr id="3" name="Text Placeholder 2"/>
@@ -8675,7 +8634,7 @@
           <p:nvPr/>
         </p:nvPicPr>
         <p:blipFill>
-          <a:blip r:embed="rId3">
+          <a:blip r:embed="rId2">
             <a:extLst>
               <a:ext uri="{28A0092B-C50C-407E-A947-70E740481C1C}">
                 <a14:useLocalDpi xmlns:a14="http://schemas.microsoft.com/office/drawing/2010/main" val="0"/>
@@ -8728,7 +8687,7 @@
           <p:nvPr/>
         </p:nvPicPr>
         <p:blipFill rotWithShape="1">
-          <a:blip r:embed="rId4">
+          <a:blip r:embed="rId3">
             <a:extLst>
               <a:ext uri="{28A0092B-C50C-407E-A947-70E740481C1C}">
                 <a14:useLocalDpi xmlns:a14="http://schemas.microsoft.com/office/drawing/2010/main" val="0"/>
@@ -8779,7 +8738,7 @@
           <p:nvPr/>
         </p:nvPicPr>
         <p:blipFill rotWithShape="1">
-          <a:blip r:embed="rId5">
+          <a:blip r:embed="rId4">
             <a:extLst>
               <a:ext uri="{28A0092B-C50C-407E-A947-70E740481C1C}">
                 <a14:useLocalDpi xmlns:a14="http://schemas.microsoft.com/office/drawing/2010/main" val="0"/>
@@ -8791,7 +8750,7 @@
         </p:blipFill>
         <p:spPr bwMode="auto">
           <a:xfrm>
-            <a:off x="3174659" y="13951319"/>
+            <a:off x="3030643" y="19727548"/>
             <a:ext cx="11340541" cy="11340542"/>
           </a:xfrm>
           <a:prstGeom prst="rect">
@@ -8830,7 +8789,7 @@
           <p:nvPr/>
         </p:nvPicPr>
         <p:blipFill>
-          <a:blip r:embed="rId6">
+          <a:blip r:embed="rId5">
             <a:extLst>
               <a:ext uri="{28A0092B-C50C-407E-A947-70E740481C1C}">
                 <a14:useLocalDpi xmlns:a14="http://schemas.microsoft.com/office/drawing/2010/main" val="0"/>
@@ -9033,6 +8992,142 @@
               </a:rPr>
               <a:t>An Image of the code working in game and setting the weather to clear</a:t>
             </a:r>
+          </a:p>
+        </p:txBody>
+      </p:sp>
+      <p:sp>
+        <p:nvSpPr>
+          <p:cNvPr id="107" name="TextBox 106"/>
+          <p:cNvSpPr txBox="1"/>
+          <p:nvPr/>
+        </p:nvSpPr>
+        <p:spPr>
+          <a:xfrm>
+            <a:off x="862064" y="31299850"/>
+            <a:ext cx="16201800" cy="3767185"/>
+          </a:xfrm>
+          <a:prstGeom prst="rect">
+            <a:avLst/>
+          </a:prstGeom>
+          <a:noFill/>
+        </p:spPr>
+        <p:txBody>
+          <a:bodyPr wrap="square" rtlCol="0">
+            <a:spAutoFit/>
+          </a:bodyPr>
+          <a:lstStyle/>
+          <a:p>
+            <a:pPr algn="ctr">
+              <a:buNone/>
+            </a:pPr>
+            <a:r>
+              <a:rPr lang="en-GB" sz="6000" dirty="0" smtClean="0">
+                <a:solidFill>
+                  <a:srgbClr val="FFFFFF"/>
+                </a:solidFill>
+                <a:latin typeface="+mn-lt"/>
+                <a:ea typeface="Tahoma" pitchFamily="34" charset="0"/>
+                <a:cs typeface="Tahoma" pitchFamily="34" charset="0"/>
+              </a:rPr>
+              <a:t>This is the final game, with oxygen placed in some of the rooms.</a:t>
+            </a:r>
+          </a:p>
+          <a:p>
+            <a:pPr>
+              <a:buNone/>
+            </a:pPr>
+            <a:endParaRPr lang="en-GB" dirty="0">
+              <a:latin typeface="+mn-lt"/>
+            </a:endParaRPr>
+          </a:p>
+        </p:txBody>
+      </p:sp>
+      <p:sp>
+        <p:nvSpPr>
+          <p:cNvPr id="108" name="TextBox 107"/>
+          <p:cNvSpPr txBox="1"/>
+          <p:nvPr/>
+        </p:nvSpPr>
+        <p:spPr>
+          <a:xfrm>
+            <a:off x="574032" y="41405134"/>
+            <a:ext cx="16849872" cy="3767185"/>
+          </a:xfrm>
+          <a:prstGeom prst="rect">
+            <a:avLst/>
+          </a:prstGeom>
+          <a:noFill/>
+        </p:spPr>
+        <p:txBody>
+          <a:bodyPr wrap="square" rtlCol="0">
+            <a:spAutoFit/>
+          </a:bodyPr>
+          <a:lstStyle/>
+          <a:p>
+            <a:pPr algn="ctr">
+              <a:buNone/>
+            </a:pPr>
+            <a:r>
+              <a:rPr lang="en-GB" sz="6000" dirty="0" smtClean="0">
+                <a:solidFill>
+                  <a:srgbClr val="FFFFFF"/>
+                </a:solidFill>
+                <a:latin typeface="+mn-lt"/>
+                <a:ea typeface="Tahoma" pitchFamily="34" charset="0"/>
+                <a:cs typeface="Tahoma" pitchFamily="34" charset="0"/>
+              </a:rPr>
+              <a:t>Sample bit of code that checks the neighbouring cells oxygen value</a:t>
+            </a:r>
+          </a:p>
+          <a:p>
+            <a:pPr>
+              <a:buNone/>
+            </a:pPr>
+            <a:endParaRPr lang="en-GB" dirty="0">
+              <a:latin typeface="+mn-lt"/>
+            </a:endParaRPr>
+          </a:p>
+        </p:txBody>
+      </p:sp>
+      <p:sp>
+        <p:nvSpPr>
+          <p:cNvPr id="18" name="TextBox 17"/>
+          <p:cNvSpPr txBox="1"/>
+          <p:nvPr/>
+        </p:nvSpPr>
+        <p:spPr>
+          <a:xfrm>
+            <a:off x="401900" y="13913919"/>
+            <a:ext cx="16201800" cy="4708981"/>
+          </a:xfrm>
+          <a:prstGeom prst="rect">
+            <a:avLst/>
+          </a:prstGeom>
+          <a:noFill/>
+        </p:spPr>
+        <p:txBody>
+          <a:bodyPr wrap="square" rtlCol="0">
+            <a:spAutoFit/>
+          </a:bodyPr>
+          <a:lstStyle/>
+          <a:p>
+            <a:pPr algn="ctr">
+              <a:buNone/>
+            </a:pPr>
+            <a:r>
+              <a:rPr lang="en-GB" sz="6000" dirty="0" smtClean="0">
+                <a:solidFill>
+                  <a:srgbClr val="FFFFFF"/>
+                </a:solidFill>
+                <a:latin typeface="+mn-lt"/>
+                <a:ea typeface="Tahoma" pitchFamily="34" charset="0"/>
+                <a:cs typeface="Tahoma" pitchFamily="34" charset="0"/>
+              </a:rPr>
+              <a:t>For the comp150 game I focused on the oxygen mechanic, this involved adding oxygen to cells in the game, and then that oxygen will spread to neighbouring cells and then that would fill a room with oxygen.</a:t>
+            </a:r>
+            <a:endParaRPr lang="en-GB" dirty="0">
+              <a:latin typeface="+mn-lt"/>
+            </a:endParaRPr>
           </a:p>
         </p:txBody>
       </p:sp>

</xml_diff>